<commit_message>
Update Presentation ASPNET - Part I.pptx
</commit_message>
<xml_diff>
--- a/Presentation ASPNET - Part I.pptx
+++ b/Presentation ASPNET - Part I.pptx
@@ -381,7 +381,7 @@
           <a:p>
             <a:fld id="{CD54E0B9-A397-428E-BA01-CD7A34B572EB}" type="datetimeFigureOut">
               <a:rPr lang="en-US" smtClean="0"/>
-              <a:t>5/14/2022</a:t>
+              <a:t>5/15/2022</a:t>
             </a:fld>
             <a:endParaRPr lang="en-US"/>
           </a:p>
@@ -546,7 +546,7 @@
           <a:p>
             <a:fld id="{AA161301-18C9-4CA0-A0BF-791B6E0DDD4D}" type="datetimeFigureOut">
               <a:rPr lang="en-GB" smtClean="0"/>
-              <a:t>14/05/2022</a:t>
+              <a:t>15/05/2022</a:t>
             </a:fld>
             <a:endParaRPr lang="en-GB"/>
           </a:p>
@@ -15021,10 +15021,7 @@
               <a:buFont typeface="Wingdings" pitchFamily="2" charset="2"/>
               <a:buChar char="§"/>
             </a:pPr>
-            <a:r>
-              <a:rPr lang="en-US" dirty="0"/>
-              <a:t> </a:t>
-            </a:r>
+            <a:endParaRPr lang="en-US" dirty="0"/>
           </a:p>
           <a:p>
             <a:pPr marL="355600" indent="-355600">
@@ -16186,7 +16183,7 @@
             </a:pPr>
             <a:r>
               <a:rPr lang="en-US" dirty="0"/>
-              <a:t>Make sure that the ASP.NET and web development workload is installed, either during setup or afterwards from Tools &gt; Get Tools and Features.</a:t>
+              <a:t>Make sure that the “ASP.NET and web development” workload is installed, either during setup or afterwards from Tools &gt; Get Tools and Features.</a:t>
             </a:r>
           </a:p>
         </p:txBody>
@@ -16903,6 +16900,58 @@
         <p:spPr>
           <a:xfrm>
             <a:off x="5303912" y="4263955"/>
+            <a:ext cx="4608512" cy="504056"/>
+          </a:xfrm>
+          <a:prstGeom prst="rect">
+            <a:avLst/>
+          </a:prstGeom>
+          <a:noFill/>
+          <a:ln>
+            <a:solidFill>
+              <a:srgbClr val="FF0000"/>
+            </a:solidFill>
+          </a:ln>
+        </p:spPr>
+        <p:style>
+          <a:lnRef idx="2">
+            <a:schemeClr val="accent1">
+              <a:shade val="50000"/>
+            </a:schemeClr>
+          </a:lnRef>
+          <a:fillRef idx="1">
+            <a:schemeClr val="accent1"/>
+          </a:fillRef>
+          <a:effectRef idx="0">
+            <a:schemeClr val="accent1"/>
+          </a:effectRef>
+          <a:fontRef idx="minor">
+            <a:schemeClr val="lt1"/>
+          </a:fontRef>
+        </p:style>
+        <p:txBody>
+          <a:bodyPr rtlCol="0" anchor="ctr"/>
+          <a:lstStyle/>
+          <a:p>
+            <a:pPr algn="ctr"/>
+            <a:endParaRPr lang="ro-RO"/>
+          </a:p>
+        </p:txBody>
+      </p:sp>
+      <p:sp>
+        <p:nvSpPr>
+          <p:cNvPr id="12" name="Rectangle 11">
+            <a:extLst>
+              <a:ext uri="{FF2B5EF4-FFF2-40B4-BE49-F238E27FC236}">
+                <a16:creationId xmlns:a16="http://schemas.microsoft.com/office/drawing/2014/main" id="{CEB05B88-2E7D-2A9E-E229-96EC83C27BBC}"/>
+              </a:ext>
+            </a:extLst>
+          </p:cNvPr>
+          <p:cNvSpPr/>
+          <p:nvPr/>
+        </p:nvSpPr>
+        <p:spPr>
+          <a:xfrm>
+            <a:off x="5303912" y="3789040"/>
             <a:ext cx="4608512" cy="504056"/>
           </a:xfrm>
           <a:prstGeom prst="rect">

</xml_diff>